<commit_message>
add leetcode 60 animation.
</commit_message>
<xml_diff>
--- a/0001-0100/LeetCode 第 60 题：“第 k 个排列”题解配图.pptx
+++ b/0001-0100/LeetCode 第 60 题：“第 k 个排列”题解配图.pptx
@@ -354,7 +354,7 @@
           <a:p>
             <a:fld id="{7C955CD6-C544-6447-88CB-A2D8D4C328B3}" type="datetimeFigureOut">
               <a:rPr kumimoji="1" lang="zh-CN" altLang="en-US" smtClean="0"/>
-              <a:t>2019/6/28</a:t>
+              <a:t>2019/7/19</a:t>
             </a:fld>
             <a:endParaRPr kumimoji="1" lang="zh-CN" altLang="en-US"/>
           </a:p>
@@ -3695,7 +3695,7 @@
               <a:t> </a:t>
             </a:r>
             <a:r>
-              <a:rPr lang="en-US" altLang="zh-CN" dirty="0">
+              <a:rPr lang="en-US" altLang="zh-CN" i="1" dirty="0">
                 <a:latin typeface="Times New Roman" panose="02020603050405020304" pitchFamily="18" charset="0"/>
                 <a:ea typeface="KaiTi_GB2312" panose="02010609030101010101" pitchFamily="49" charset="-122"/>
                 <a:cs typeface="Times New Roman" panose="02020603050405020304" pitchFamily="18" charset="0"/>
@@ -3932,6 +3932,42 @@
           </a:p>
         </p:txBody>
       </p:sp>
+      <p:pic>
+        <p:nvPicPr>
+          <p:cNvPr id="20" name="图形 19" descr="剪刀">
+            <a:extLst>
+              <a:ext uri="{FF2B5EF4-FFF2-40B4-BE49-F238E27FC236}">
+                <a16:creationId xmlns:a16="http://schemas.microsoft.com/office/drawing/2014/main" id="{BBE1F2F8-8981-1E4B-B042-F959957CD211}"/>
+              </a:ext>
+            </a:extLst>
+          </p:cNvPr>
+          <p:cNvPicPr>
+            <a:picLocks noChangeAspect="1"/>
+          </p:cNvPicPr>
+          <p:nvPr/>
+        </p:nvPicPr>
+        <p:blipFill>
+          <a:blip r:embed="rId3">
+            <a:extLst>
+              <a:ext uri="{96DAC541-7B7A-43D3-8B79-37D633B846F1}">
+                <asvg:svgBlip xmlns:asvg="http://schemas.microsoft.com/office/drawing/2016/SVG/main" r:embed="rId4"/>
+              </a:ext>
+            </a:extLst>
+          </a:blip>
+          <a:stretch>
+            <a:fillRect/>
+          </a:stretch>
+        </p:blipFill>
+        <p:spPr>
+          <a:xfrm>
+            <a:off x="4334073" y="1789566"/>
+            <a:ext cx="501367" cy="501367"/>
+          </a:xfrm>
+          <a:prstGeom prst="rect">
+            <a:avLst/>
+          </a:prstGeom>
+        </p:spPr>
+      </p:pic>
     </p:spTree>
     <p:extLst>
       <p:ext uri="{BB962C8B-B14F-4D97-AF65-F5344CB8AC3E}">
@@ -4571,7 +4607,15 @@
                 <a:ea typeface="KaiTi_GB2312" panose="02010609030101010101" pitchFamily="49" charset="-122"/>
                 <a:cs typeface="Times New Roman" panose="02020603050405020304" pitchFamily="18" charset="0"/>
               </a:rPr>
-              <a:t> k</a:t>
+              <a:t> </a:t>
+            </a:r>
+            <a:r>
+              <a:rPr lang="en-US" altLang="zh-CN" i="1" dirty="0">
+                <a:latin typeface="Times New Roman" panose="02020603050405020304" pitchFamily="18" charset="0"/>
+                <a:ea typeface="KaiTi_GB2312" panose="02010609030101010101" pitchFamily="49" charset="-122"/>
+                <a:cs typeface="Times New Roman" panose="02020603050405020304" pitchFamily="18" charset="0"/>
+              </a:rPr>
+              <a:t>k</a:t>
             </a:r>
             <a:r>
               <a:rPr lang="zh-CN" altLang="en-US" dirty="0">
@@ -5578,7 +5622,7 @@
               <a:t>此时 </a:t>
             </a:r>
             <a:r>
-              <a:rPr lang="en-US" altLang="zh-CN" dirty="0">
+              <a:rPr lang="en-US" altLang="zh-CN" i="1" dirty="0">
                 <a:latin typeface="Times New Roman" panose="02020603050405020304" pitchFamily="18" charset="0"/>
                 <a:ea typeface="KaiTi_GB2312" panose="02010609030101010101" pitchFamily="49" charset="-122"/>
                 <a:cs typeface="Times New Roman" panose="02020603050405020304" pitchFamily="18" charset="0"/>
@@ -5704,7 +5748,7 @@
               <a:t>根据之前的分析，</a:t>
             </a:r>
             <a:r>
-              <a:rPr lang="en-US" altLang="zh-CN" dirty="0">
+              <a:rPr lang="en-US" altLang="zh-CN" i="1" dirty="0">
                 <a:latin typeface="Times New Roman" panose="02020603050405020304" pitchFamily="18" charset="0"/>
                 <a:ea typeface="KaiTi_GB2312" panose="02010609030101010101" pitchFamily="49" charset="-122"/>
                 <a:cs typeface="Times New Roman" panose="02020603050405020304" pitchFamily="18" charset="0"/>
@@ -5720,7 +5764,7 @@
               <a:t> 应该再减去这里“剪枝”的叶子结点个数，即 </a:t>
             </a:r>
             <a:r>
-              <a:rPr lang="en-US" altLang="zh-CN" dirty="0">
+              <a:rPr lang="en-US" altLang="zh-CN" i="1" dirty="0">
                 <a:latin typeface="Times New Roman" panose="02020603050405020304" pitchFamily="18" charset="0"/>
                 <a:ea typeface="KaiTi_GB2312" panose="02010609030101010101" pitchFamily="49" charset="-122"/>
                 <a:cs typeface="Times New Roman" panose="02020603050405020304" pitchFamily="18" charset="0"/>
@@ -6040,6 +6084,42 @@
           </a:p>
         </p:txBody>
       </p:sp>
+      <p:pic>
+        <p:nvPicPr>
+          <p:cNvPr id="11" name="图形 10" descr="剪刀">
+            <a:extLst>
+              <a:ext uri="{FF2B5EF4-FFF2-40B4-BE49-F238E27FC236}">
+                <a16:creationId xmlns:a16="http://schemas.microsoft.com/office/drawing/2014/main" id="{A4821307-42FA-634A-A9D5-A094DB6427F0}"/>
+              </a:ext>
+            </a:extLst>
+          </p:cNvPr>
+          <p:cNvPicPr>
+            <a:picLocks noChangeAspect="1"/>
+          </p:cNvPicPr>
+          <p:nvPr/>
+        </p:nvPicPr>
+        <p:blipFill>
+          <a:blip r:embed="rId3">
+            <a:extLst>
+              <a:ext uri="{96DAC541-7B7A-43D3-8B79-37D633B846F1}">
+                <asvg:svgBlip xmlns:asvg="http://schemas.microsoft.com/office/drawing/2016/SVG/main" r:embed="rId4"/>
+              </a:ext>
+            </a:extLst>
+          </a:blip>
+          <a:stretch>
+            <a:fillRect/>
+          </a:stretch>
+        </p:blipFill>
+        <p:spPr>
+          <a:xfrm>
+            <a:off x="6859389" y="2865805"/>
+            <a:ext cx="501367" cy="501367"/>
+          </a:xfrm>
+          <a:prstGeom prst="rect">
+            <a:avLst/>
+          </a:prstGeom>
+        </p:spPr>
+      </p:pic>
     </p:spTree>
     <p:extLst>
       <p:ext uri="{BB962C8B-B14F-4D97-AF65-F5344CB8AC3E}">
@@ -6567,7 +6647,7 @@
               <a:t>此时 </a:t>
             </a:r>
             <a:r>
-              <a:rPr lang="en-US" altLang="zh-CN" dirty="0">
+              <a:rPr lang="en-US" altLang="zh-CN" i="1" dirty="0">
                 <a:latin typeface="Times New Roman" panose="02020603050405020304" pitchFamily="18" charset="0"/>
                 <a:ea typeface="KaiTi_GB2312" panose="02010609030101010101" pitchFamily="49" charset="-122"/>
                 <a:cs typeface="Times New Roman" panose="02020603050405020304" pitchFamily="18" charset="0"/>
@@ -6580,6 +6660,22 @@
                 <a:ea typeface="KaiTi_GB2312" panose="02010609030101010101" pitchFamily="49" charset="-122"/>
                 <a:cs typeface="Times New Roman" panose="02020603050405020304" pitchFamily="18" charset="0"/>
               </a:rPr>
+              <a:t>  </a:t>
+            </a:r>
+            <a:r>
+              <a:rPr lang="en-US" altLang="zh-CN" dirty="0">
+                <a:latin typeface="Times New Roman" panose="02020603050405020304" pitchFamily="18" charset="0"/>
+                <a:ea typeface="KaiTi_GB2312" panose="02010609030101010101" pitchFamily="49" charset="-122"/>
+                <a:cs typeface="Times New Roman" panose="02020603050405020304" pitchFamily="18" charset="0"/>
+              </a:rPr>
+              <a:t>=</a:t>
+            </a:r>
+            <a:r>
+              <a:rPr lang="zh-CN" altLang="en-US" dirty="0">
+                <a:latin typeface="Times New Roman" panose="02020603050405020304" pitchFamily="18" charset="0"/>
+                <a:ea typeface="KaiTi_GB2312" panose="02010609030101010101" pitchFamily="49" charset="-122"/>
+                <a:cs typeface="Times New Roman" panose="02020603050405020304" pitchFamily="18" charset="0"/>
+              </a:rPr>
               <a:t> </a:t>
             </a:r>
             <a:r>
@@ -6588,6 +6684,22 @@
                 <a:ea typeface="KaiTi_GB2312" panose="02010609030101010101" pitchFamily="49" charset="-122"/>
                 <a:cs typeface="Times New Roman" panose="02020603050405020304" pitchFamily="18" charset="0"/>
               </a:rPr>
+              <a:t>1</a:t>
+            </a:r>
+            <a:r>
+              <a:rPr lang="zh-CN" altLang="en-US" dirty="0">
+                <a:latin typeface="Times New Roman" panose="02020603050405020304" pitchFamily="18" charset="0"/>
+                <a:ea typeface="KaiTi_GB2312" panose="02010609030101010101" pitchFamily="49" charset="-122"/>
+                <a:cs typeface="Times New Roman" panose="02020603050405020304" pitchFamily="18" charset="0"/>
+              </a:rPr>
+              <a:t> </a:t>
+            </a:r>
+            <a:r>
+              <a:rPr lang="en-US" altLang="zh-CN" dirty="0">
+                <a:latin typeface="Times New Roman" panose="02020603050405020304" pitchFamily="18" charset="0"/>
+                <a:ea typeface="KaiTi_GB2312" panose="02010609030101010101" pitchFamily="49" charset="-122"/>
+                <a:cs typeface="Times New Roman" panose="02020603050405020304" pitchFamily="18" charset="0"/>
+              </a:rPr>
               <a:t>=</a:t>
             </a:r>
             <a:r>
@@ -6612,39 +6724,22 @@
                 <a:ea typeface="KaiTi_GB2312" panose="02010609030101010101" pitchFamily="49" charset="-122"/>
                 <a:cs typeface="Times New Roman" panose="02020603050405020304" pitchFamily="18" charset="0"/>
               </a:rPr>
-              <a:t> </a:t>
-            </a:r>
-            <a:r>
-              <a:rPr lang="en-US" altLang="zh-CN" dirty="0">
-                <a:latin typeface="Times New Roman" panose="02020603050405020304" pitchFamily="18" charset="0"/>
-                <a:ea typeface="KaiTi_GB2312" panose="02010609030101010101" pitchFamily="49" charset="-122"/>
-                <a:cs typeface="Times New Roman" panose="02020603050405020304" pitchFamily="18" charset="0"/>
-              </a:rPr>
-              <a:t>=</a:t>
-            </a:r>
-            <a:r>
-              <a:rPr lang="zh-CN" altLang="en-US" dirty="0">
-                <a:latin typeface="Times New Roman" panose="02020603050405020304" pitchFamily="18" charset="0"/>
-                <a:ea typeface="KaiTi_GB2312" panose="02010609030101010101" pitchFamily="49" charset="-122"/>
-                <a:cs typeface="Times New Roman" panose="02020603050405020304" pitchFamily="18" charset="0"/>
-              </a:rPr>
-              <a:t> </a:t>
-            </a:r>
-            <a:r>
-              <a:rPr lang="en-US" altLang="zh-CN" dirty="0">
-                <a:latin typeface="Times New Roman" panose="02020603050405020304" pitchFamily="18" charset="0"/>
-                <a:ea typeface="KaiTi_GB2312" panose="02010609030101010101" pitchFamily="49" charset="-122"/>
-                <a:cs typeface="Times New Roman" panose="02020603050405020304" pitchFamily="18" charset="0"/>
-              </a:rPr>
-              <a:t>1</a:t>
-            </a:r>
-            <a:r>
-              <a:rPr lang="zh-CN" altLang="en-US" dirty="0">
-                <a:latin typeface="Times New Roman" panose="02020603050405020304" pitchFamily="18" charset="0"/>
-                <a:ea typeface="KaiTi_GB2312" panose="02010609030101010101" pitchFamily="49" charset="-122"/>
-                <a:cs typeface="Times New Roman" panose="02020603050405020304" pitchFamily="18" charset="0"/>
-              </a:rPr>
-              <a:t>，因此，所求的全排列一定在以“</a:t>
+              <a:t>，</a:t>
+            </a:r>
+            <a:endParaRPr lang="en-US" altLang="zh-CN" dirty="0">
+              <a:latin typeface="Times New Roman" panose="02020603050405020304" pitchFamily="18" charset="0"/>
+              <a:ea typeface="KaiTi_GB2312" panose="02010609030101010101" pitchFamily="49" charset="-122"/>
+              <a:cs typeface="Times New Roman" panose="02020603050405020304" pitchFamily="18" charset="0"/>
+            </a:endParaRPr>
+          </a:p>
+          <a:p>
+            <a:r>
+              <a:rPr lang="zh-CN" altLang="en-US" dirty="0">
+                <a:latin typeface="Times New Roman" panose="02020603050405020304" pitchFamily="18" charset="0"/>
+                <a:ea typeface="KaiTi_GB2312" panose="02010609030101010101" pitchFamily="49" charset="-122"/>
+                <a:cs typeface="Times New Roman" panose="02020603050405020304" pitchFamily="18" charset="0"/>
+              </a:rPr>
+              <a:t>因此，所求的全排列一定在以“</a:t>
             </a:r>
             <a:r>
               <a:rPr lang="en-US" altLang="zh-CN" dirty="0">
@@ -7201,7 +7296,7 @@
         <p:spPr>
           <a:xfrm>
             <a:off x="169554" y="4864905"/>
-            <a:ext cx="6185417" cy="1200329"/>
+            <a:ext cx="6185417" cy="1477328"/>
           </a:xfrm>
           <a:prstGeom prst="rect">
             <a:avLst/>
@@ -7367,7 +7462,7 @@
               <a:t>此时 </a:t>
             </a:r>
             <a:r>
-              <a:rPr lang="en-US" altLang="zh-CN" dirty="0">
+              <a:rPr lang="en-US" altLang="zh-CN" i="1" dirty="0">
                 <a:latin typeface="Times New Roman" panose="02020603050405020304" pitchFamily="18" charset="0"/>
                 <a:ea typeface="KaiTi_GB2312" panose="02010609030101010101" pitchFamily="49" charset="-122"/>
                 <a:cs typeface="Times New Roman" panose="02020603050405020304" pitchFamily="18" charset="0"/>
@@ -7444,7 +7539,22 @@
                 <a:ea typeface="KaiTi_GB2312" panose="02010609030101010101" pitchFamily="49" charset="-122"/>
                 <a:cs typeface="Times New Roman" panose="02020603050405020304" pitchFamily="18" charset="0"/>
               </a:rPr>
-              <a:t>，因此，所求的全排列一定在以“</a:t>
+              <a:t>，</a:t>
+            </a:r>
+            <a:endParaRPr lang="en-US" altLang="zh-CN" dirty="0">
+              <a:latin typeface="Times New Roman" panose="02020603050405020304" pitchFamily="18" charset="0"/>
+              <a:ea typeface="KaiTi_GB2312" panose="02010609030101010101" pitchFamily="49" charset="-122"/>
+              <a:cs typeface="Times New Roman" panose="02020603050405020304" pitchFamily="18" charset="0"/>
+            </a:endParaRPr>
+          </a:p>
+          <a:p>
+            <a:r>
+              <a:rPr lang="zh-CN" altLang="en-US" dirty="0">
+                <a:latin typeface="Times New Roman" panose="02020603050405020304" pitchFamily="18" charset="0"/>
+                <a:ea typeface="KaiTi_GB2312" panose="02010609030101010101" pitchFamily="49" charset="-122"/>
+                <a:cs typeface="Times New Roman" panose="02020603050405020304" pitchFamily="18" charset="0"/>
+              </a:rPr>
+              <a:t>因此，所求的全排列一定在以“</a:t>
             </a:r>
             <a:r>
               <a:rPr lang="en-US" altLang="zh-CN" dirty="0">

</xml_diff>